<commit_message>
add slide code review
</commit_message>
<xml_diff>
--- a/02_EDA/99_Project_Speed_Dating/speed_dating_project_v2.pptx
+++ b/02_EDA/99_Project_Speed_Dating/speed_dating_project_v2.pptx
@@ -5,7 +5,7 @@
     <p:sldMasterId id="2147483660" r:id="rId1"/>
   </p:sldMasterIdLst>
   <p:notesMasterIdLst>
-    <p:notesMasterId r:id="rId23"/>
+    <p:notesMasterId r:id="rId24"/>
   </p:notesMasterIdLst>
   <p:sldIdLst>
     <p:sldId id="256" r:id="rId2"/>
@@ -29,6 +29,7 @@
     <p:sldId id="278" r:id="rId20"/>
     <p:sldId id="279" r:id="rId21"/>
     <p:sldId id="257" r:id="rId22"/>
+    <p:sldId id="263" r:id="rId23"/>
   </p:sldIdLst>
   <p:sldSz cx="12192000" cy="6858000"/>
   <p:notesSz cx="6858000" cy="9144000"/>
@@ -138,7 +139,7 @@
 <file path=ppt/revisionInfo.xml><?xml version="1.0" encoding="utf-8"?>
 <p1510:revInfo xmlns:a="http://schemas.openxmlformats.org/drawingml/2006/main" xmlns:r="http://schemas.openxmlformats.org/officeDocument/2006/relationships" xmlns:p1510="http://schemas.microsoft.com/office/powerpoint/2015/10/main">
   <p1510:revLst>
-    <p1510:client id="{B2EE689F-2065-402A-8908-926DEA39FEF1}" v="24" dt="2024-08-20T16:47:30.252"/>
+    <p1510:client id="{B2EE689F-2065-402A-8908-926DEA39FEF1}" v="25" dt="2024-08-22T08:17:02.568"/>
   </p1510:revLst>
 </p1510:revInfo>
 </file>
@@ -195,7 +196,7 @@
   <pc:docChgLst>
     <pc:chgData name="Philippe Baucour" userId="5102170ae7533958" providerId="LiveId" clId="{B2EE689F-2065-402A-8908-926DEA39FEF1}"/>
     <pc:docChg chg="undo custSel addSld delSld modSld sldOrd">
-      <pc:chgData name="Philippe Baucour" userId="5102170ae7533958" providerId="LiveId" clId="{B2EE689F-2065-402A-8908-926DEA39FEF1}" dt="2024-08-20T16:49:57.237" v="2645" actId="700"/>
+      <pc:chgData name="Philippe Baucour" userId="5102170ae7533958" providerId="LiveId" clId="{B2EE689F-2065-402A-8908-926DEA39FEF1}" dt="2024-08-22T08:17:02.561" v="2646"/>
       <pc:docMkLst>
         <pc:docMk/>
       </pc:docMkLst>
@@ -387,6 +388,13 @@
             <ac:spMk id="4" creationId="{89BF95F5-742F-BEE1-0DE9-2ECD77A3A8FC}"/>
           </ac:spMkLst>
         </pc:spChg>
+      </pc:sldChg>
+      <pc:sldChg chg="add">
+        <pc:chgData name="Philippe Baucour" userId="5102170ae7533958" providerId="LiveId" clId="{B2EE689F-2065-402A-8908-926DEA39FEF1}" dt="2024-08-22T08:17:02.561" v="2646"/>
+        <pc:sldMkLst>
+          <pc:docMk/>
+          <pc:sldMk cId="312535264" sldId="263"/>
+        </pc:sldMkLst>
       </pc:sldChg>
       <pc:sldChg chg="modSp add mod">
         <pc:chgData name="Philippe Baucour" userId="5102170ae7533958" providerId="LiveId" clId="{B2EE689F-2065-402A-8908-926DEA39FEF1}" dt="2024-08-20T14:20:52.676" v="283" actId="20577"/>
@@ -7840,7 +7848,7 @@
           <a:p>
             <a:fld id="{FD1752CD-A7D2-4825-BC26-9DAEFBD0A5FF}" type="datetimeFigureOut">
               <a:rPr lang="fr-FR" smtClean="0"/>
-              <a:t>20/08/2024</a:t>
+              <a:t>22/08/2024</a:t>
             </a:fld>
             <a:endParaRPr lang="fr-FR"/>
           </a:p>
@@ -8655,7 +8663,7 @@
           <a:p>
             <a:fld id="{7ECB9D5A-E5E4-41FE-AF39-634902D6D5D2}" type="datetimeFigureOut">
               <a:rPr lang="fr-FR" smtClean="0"/>
-              <a:t>20/08/2024</a:t>
+              <a:t>22/08/2024</a:t>
             </a:fld>
             <a:endParaRPr lang="fr-FR"/>
           </a:p>
@@ -8853,7 +8861,7 @@
           <a:p>
             <a:fld id="{7ECB9D5A-E5E4-41FE-AF39-634902D6D5D2}" type="datetimeFigureOut">
               <a:rPr lang="fr-FR" smtClean="0"/>
-              <a:t>20/08/2024</a:t>
+              <a:t>22/08/2024</a:t>
             </a:fld>
             <a:endParaRPr lang="fr-FR"/>
           </a:p>
@@ -9061,7 +9069,7 @@
           <a:p>
             <a:fld id="{7ECB9D5A-E5E4-41FE-AF39-634902D6D5D2}" type="datetimeFigureOut">
               <a:rPr lang="fr-FR" smtClean="0"/>
-              <a:t>20/08/2024</a:t>
+              <a:t>22/08/2024</a:t>
             </a:fld>
             <a:endParaRPr lang="fr-FR"/>
           </a:p>
@@ -9221,7 +9229,7 @@
           </a:ln>
           <a:extLst>
             <a:ext uri="{C572A759-6A51-4108-AA02-DFA0A04FC94B}">
-              <ma14:wrappingTextBoxFlag xmlns="" xmlns:ma14="http://schemas.microsoft.com/office/mac/drawingml/2011/main" val="1"/>
+              <ma14:wrappingTextBoxFlag xmlns:ma14="http://schemas.microsoft.com/office/mac/drawingml/2011/main" xmlns="" val="1"/>
             </a:ext>
           </a:extLst>
         </p:spPr>
@@ -9478,7 +9486,7 @@
           <a:p>
             <a:fld id="{7ECB9D5A-E5E4-41FE-AF39-634902D6D5D2}" type="datetimeFigureOut">
               <a:rPr lang="fr-FR" smtClean="0"/>
-              <a:t>20/08/2024</a:t>
+              <a:t>22/08/2024</a:t>
             </a:fld>
             <a:endParaRPr lang="fr-FR"/>
           </a:p>
@@ -9753,7 +9761,7 @@
           <a:p>
             <a:fld id="{7ECB9D5A-E5E4-41FE-AF39-634902D6D5D2}" type="datetimeFigureOut">
               <a:rPr lang="fr-FR" smtClean="0"/>
-              <a:t>20/08/2024</a:t>
+              <a:t>22/08/2024</a:t>
             </a:fld>
             <a:endParaRPr lang="fr-FR"/>
           </a:p>
@@ -10018,7 +10026,7 @@
           <a:p>
             <a:fld id="{7ECB9D5A-E5E4-41FE-AF39-634902D6D5D2}" type="datetimeFigureOut">
               <a:rPr lang="fr-FR" smtClean="0"/>
-              <a:t>20/08/2024</a:t>
+              <a:t>22/08/2024</a:t>
             </a:fld>
             <a:endParaRPr lang="fr-FR"/>
           </a:p>
@@ -10430,7 +10438,7 @@
           <a:p>
             <a:fld id="{7ECB9D5A-E5E4-41FE-AF39-634902D6D5D2}" type="datetimeFigureOut">
               <a:rPr lang="fr-FR" smtClean="0"/>
-              <a:t>20/08/2024</a:t>
+              <a:t>22/08/2024</a:t>
             </a:fld>
             <a:endParaRPr lang="fr-FR"/>
           </a:p>
@@ -10571,7 +10579,7 @@
           <a:p>
             <a:fld id="{7ECB9D5A-E5E4-41FE-AF39-634902D6D5D2}" type="datetimeFigureOut">
               <a:rPr lang="fr-FR" smtClean="0"/>
-              <a:t>20/08/2024</a:t>
+              <a:t>22/08/2024</a:t>
             </a:fld>
             <a:endParaRPr lang="fr-FR"/>
           </a:p>
@@ -10684,7 +10692,7 @@
           <a:p>
             <a:fld id="{7ECB9D5A-E5E4-41FE-AF39-634902D6D5D2}" type="datetimeFigureOut">
               <a:rPr lang="fr-FR" smtClean="0"/>
-              <a:t>20/08/2024</a:t>
+              <a:t>22/08/2024</a:t>
             </a:fld>
             <a:endParaRPr lang="fr-FR"/>
           </a:p>
@@ -10995,7 +11003,7 @@
           <a:p>
             <a:fld id="{7ECB9D5A-E5E4-41FE-AF39-634902D6D5D2}" type="datetimeFigureOut">
               <a:rPr lang="fr-FR" smtClean="0"/>
-              <a:t>20/08/2024</a:t>
+              <a:t>22/08/2024</a:t>
             </a:fld>
             <a:endParaRPr lang="fr-FR"/>
           </a:p>
@@ -11286,7 +11294,7 @@
           <a:p>
             <a:fld id="{7ECB9D5A-E5E4-41FE-AF39-634902D6D5D2}" type="datetimeFigureOut">
               <a:rPr lang="fr-FR" smtClean="0"/>
-              <a:t>20/08/2024</a:t>
+              <a:t>22/08/2024</a:t>
             </a:fld>
             <a:endParaRPr lang="fr-FR"/>
           </a:p>
@@ -11527,7 +11535,7 @@
           <a:p>
             <a:fld id="{7ECB9D5A-E5E4-41FE-AF39-634902D6D5D2}" type="datetimeFigureOut">
               <a:rPr lang="fr-FR" smtClean="0"/>
-              <a:t>20/08/2024</a:t>
+              <a:t>22/08/2024</a:t>
             </a:fld>
             <a:endParaRPr lang="fr-FR"/>
           </a:p>
@@ -15383,6 +15391,100 @@
     <p:extLst>
       <p:ext uri="{BB962C8B-B14F-4D97-AF65-F5344CB8AC3E}">
         <p14:creationId xmlns:p14="http://schemas.microsoft.com/office/powerpoint/2010/main" val="3201622378"/>
+      </p:ext>
+    </p:extLst>
+  </p:cSld>
+  <p:clrMapOvr>
+    <a:masterClrMapping/>
+  </p:clrMapOvr>
+</p:sld>
+</file>
+
+<file path=ppt/slides/slide22.xml><?xml version="1.0" encoding="utf-8"?>
+<p:sld xmlns:a="http://schemas.openxmlformats.org/drawingml/2006/main" xmlns:r="http://schemas.openxmlformats.org/officeDocument/2006/relationships" xmlns:p="http://schemas.openxmlformats.org/presentationml/2006/main">
+  <p:cSld>
+    <p:spTree>
+      <p:nvGrpSpPr>
+        <p:cNvPr id="1" name=""/>
+        <p:cNvGrpSpPr/>
+        <p:nvPr/>
+      </p:nvGrpSpPr>
+      <p:grpSpPr>
+        <a:xfrm>
+          <a:off x="0" y="0"/>
+          <a:ext cx="0" cy="0"/>
+          <a:chOff x="0" y="0"/>
+          <a:chExt cx="0" cy="0"/>
+        </a:xfrm>
+      </p:grpSpPr>
+      <p:sp>
+        <p:nvSpPr>
+          <p:cNvPr id="4" name="Titre 3">
+            <a:extLst>
+              <a:ext uri="{FF2B5EF4-FFF2-40B4-BE49-F238E27FC236}">
+                <a16:creationId xmlns:a16="http://schemas.microsoft.com/office/drawing/2014/main" id="{80E590DF-0A88-7056-85D1-A8E809E2318F}"/>
+              </a:ext>
+            </a:extLst>
+          </p:cNvPr>
+          <p:cNvSpPr>
+            <a:spLocks noGrp="1"/>
+          </p:cNvSpPr>
+          <p:nvPr>
+            <p:ph type="title"/>
+          </p:nvPr>
+        </p:nvSpPr>
+        <p:spPr>
+          <a:xfrm>
+            <a:off x="831850" y="1709738"/>
+            <a:ext cx="10515600" cy="1837859"/>
+          </a:xfrm>
+        </p:spPr>
+        <p:txBody>
+          <a:bodyPr/>
+          <a:lstStyle/>
+          <a:p>
+            <a:pPr algn="ctr"/>
+            <a:r>
+              <a:rPr lang="fr-FR" dirty="0"/>
+              <a:t>Code </a:t>
+            </a:r>
+            <a:r>
+              <a:rPr lang="fr-FR" dirty="0" err="1"/>
+              <a:t>Review</a:t>
+            </a:r>
+            <a:endParaRPr lang="fr-FR" dirty="0"/>
+          </a:p>
+        </p:txBody>
+      </p:sp>
+      <p:sp>
+        <p:nvSpPr>
+          <p:cNvPr id="5" name="Espace réservé du texte 4">
+            <a:extLst>
+              <a:ext uri="{FF2B5EF4-FFF2-40B4-BE49-F238E27FC236}">
+                <a16:creationId xmlns:a16="http://schemas.microsoft.com/office/drawing/2014/main" id="{64E8BF61-007C-0740-1AA1-06B9449B33C7}"/>
+              </a:ext>
+            </a:extLst>
+          </p:cNvPr>
+          <p:cNvSpPr>
+            <a:spLocks noGrp="1"/>
+          </p:cNvSpPr>
+          <p:nvPr>
+            <p:ph type="body" idx="1"/>
+          </p:nvPr>
+        </p:nvSpPr>
+        <p:spPr/>
+        <p:txBody>
+          <a:bodyPr/>
+          <a:lstStyle/>
+          <a:p>
+            <a:endParaRPr lang="fr-FR"/>
+          </a:p>
+        </p:txBody>
+      </p:sp>
+    </p:spTree>
+    <p:extLst>
+      <p:ext uri="{BB962C8B-B14F-4D97-AF65-F5344CB8AC3E}">
+        <p14:creationId xmlns:p14="http://schemas.microsoft.com/office/powerpoint/2010/main" val="312535264"/>
       </p:ext>
     </p:extLst>
   </p:cSld>

</xml_diff>